<commit_message>
Update - Correct Confusion Matrices Comparation
</commit_message>
<xml_diff>
--- a/Fine-Tuning HateBERT for Hate Speech Classification - POSTER.pptx
+++ b/Fine-Tuning HateBERT for Hate Speech Classification - POSTER.pptx
@@ -1772,7 +1772,7 @@
           <a:p>
             <a:fld id="{985D6BDF-9D0E-4E2B-85B8-D8F4790360C9}" type="datetimeFigureOut">
               <a:rPr lang="en-US" smtClean="0"/>
-              <a:t>5/22/2025</a:t>
+              <a:t>5/26/2025</a:t>
             </a:fld>
             <a:endParaRPr lang="en-US" dirty="0"/>
           </a:p>
@@ -1983,7 +1983,7 @@
           <a:p>
             <a:fld id="{985D6BDF-9D0E-4E2B-85B8-D8F4790360C9}" type="datetimeFigureOut">
               <a:rPr lang="en-US" smtClean="0"/>
-              <a:t>5/22/2025</a:t>
+              <a:t>5/26/2025</a:t>
             </a:fld>
             <a:endParaRPr lang="en-US" dirty="0"/>
           </a:p>
@@ -3602,7 +3602,7 @@
                 <a:latin typeface="Times New Roman" panose="02020603050405020304" pitchFamily="18" charset="0"/>
                 <a:cs typeface="Times New Roman" panose="02020603050405020304" pitchFamily="18" charset="0"/>
               </a:rPr>
-              <a:t>Online platforms enable communication but are challenged by hate speech—harmful, discriminatory language, making effective automated detection truly important. This project fine-tunes HateBERT to build a reliable binary hate speech classifier for social platforms, aiming to reduce harmful content and protect vulnerable users. </a:t>
+              <a:t>Online platforms enable communication but are challenged by hate speech such as harmful, discriminatory language, making effective automated detection truly important. This project fine-tunes HateBERT to build a reliable binary hate speech classifier for social platforms, aiming to reduce harmful content and protect vulnerable users. </a:t>
             </a:r>
           </a:p>
           <a:p>
@@ -4828,7 +4828,21 @@
                 <a:latin typeface="Times New Roman" panose="02020603050405020304" pitchFamily="18" charset="0"/>
                 <a:cs typeface="Times New Roman" panose="02020603050405020304" pitchFamily="18" charset="0"/>
               </a:rPr>
-              <a:t>When tested using the test set (which contains 33,508 examples), the model achieved an overall </a:t>
+              <a:t>When tested using the test set (which contains </a:t>
+            </a:r>
+            <a:r>
+              <a:rPr lang="en-US" sz="2800">
+                <a:latin typeface="Times New Roman" panose="02020603050405020304" pitchFamily="18" charset="0"/>
+                <a:cs typeface="Times New Roman" panose="02020603050405020304" pitchFamily="18" charset="0"/>
+              </a:rPr>
+              <a:t>33,508 samples), </a:t>
+            </a:r>
+            <a:r>
+              <a:rPr lang="en-US" sz="2800" dirty="0">
+                <a:latin typeface="Times New Roman" panose="02020603050405020304" pitchFamily="18" charset="0"/>
+                <a:cs typeface="Times New Roman" panose="02020603050405020304" pitchFamily="18" charset="0"/>
+              </a:rPr>
+              <a:t>the model achieved an overall </a:t>
             </a:r>
             <a:r>
               <a:rPr lang="en-US" sz="2800" b="1" dirty="0">
@@ -5708,76 +5722,6 @@
           </a:p>
         </p:txBody>
       </p:sp>
-      <p:pic>
-        <p:nvPicPr>
-          <p:cNvPr id="48" name="Picture 47" descr="A blue squares with numbers and labels&#10;&#10;AI-generated content may be incorrect.">
-            <a:extLst>
-              <a:ext uri="{FF2B5EF4-FFF2-40B4-BE49-F238E27FC236}">
-                <a16:creationId xmlns:a16="http://schemas.microsoft.com/office/drawing/2014/main" id="{5FEB5FA7-887C-0CA9-9579-4480E99E0BA3}"/>
-              </a:ext>
-            </a:extLst>
-          </p:cNvPr>
-          <p:cNvPicPr>
-            <a:picLocks noChangeAspect="1"/>
-          </p:cNvPicPr>
-          <p:nvPr/>
-        </p:nvPicPr>
-        <p:blipFill>
-          <a:blip r:embed="rId7">
-            <a:extLst>
-              <a:ext uri="{28A0092B-C50C-407E-A947-70E740481C1C}">
-                <a14:useLocalDpi xmlns:a14="http://schemas.microsoft.com/office/drawing/2010/main" val="0"/>
-              </a:ext>
-            </a:extLst>
-          </a:blip>
-          <a:srcRect l="6652" t="8134" r="11750" b="3903"/>
-          <a:stretch/>
-        </p:blipFill>
-        <p:spPr>
-          <a:xfrm>
-            <a:off x="20148469" y="15952399"/>
-            <a:ext cx="8595360" cy="6949438"/>
-          </a:xfrm>
-          <a:prstGeom prst="rect">
-            <a:avLst/>
-          </a:prstGeom>
-        </p:spPr>
-      </p:pic>
-      <p:pic>
-        <p:nvPicPr>
-          <p:cNvPr id="54" name="Picture 53" descr="A blue squares with white text&#10;&#10;AI-generated content may be incorrect.">
-            <a:extLst>
-              <a:ext uri="{FF2B5EF4-FFF2-40B4-BE49-F238E27FC236}">
-                <a16:creationId xmlns:a16="http://schemas.microsoft.com/office/drawing/2014/main" id="{3C4BB408-FA2E-F23D-603B-7C1FA6DE510D}"/>
-              </a:ext>
-            </a:extLst>
-          </p:cNvPr>
-          <p:cNvPicPr>
-            <a:picLocks noChangeAspect="1"/>
-          </p:cNvPicPr>
-          <p:nvPr/>
-        </p:nvPicPr>
-        <p:blipFill>
-          <a:blip r:embed="rId8">
-            <a:extLst>
-              <a:ext uri="{28A0092B-C50C-407E-A947-70E740481C1C}">
-                <a14:useLocalDpi xmlns:a14="http://schemas.microsoft.com/office/drawing/2010/main" val="0"/>
-              </a:ext>
-            </a:extLst>
-          </a:blip>
-          <a:srcRect l="6633" t="7362" r="11578" b="3767"/>
-          <a:stretch/>
-        </p:blipFill>
-        <p:spPr>
-          <a:xfrm>
-            <a:off x="20370792" y="23720803"/>
-            <a:ext cx="8412480" cy="6855726"/>
-          </a:xfrm>
-          <a:prstGeom prst="rect">
-            <a:avLst/>
-          </a:prstGeom>
-        </p:spPr>
-      </p:pic>
       <p:sp>
         <p:nvSpPr>
           <p:cNvPr id="57" name="Text Box 192">
@@ -5977,7 +5921,7 @@
                 <a:latin typeface="Times New Roman" panose="02020603050405020304" pitchFamily="18" charset="0"/>
                 <a:cs typeface="Times New Roman" panose="02020603050405020304" pitchFamily="18" charset="0"/>
               </a:rPr>
-              <a:t> of steps gradually increases the rate from zero to the base value, then decays it to stabilize training. Batches of size 32 are used with gradient accumulation over two steps, simulating an effective </a:t>
+              <a:t> of steps gradually increases the rate from zero to the base value, then decays it to stabilize training. Batches of size 32 are used with gradient accumulation equal to 2, simulating an effective </a:t>
             </a:r>
             <a:r>
               <a:rPr lang="en-US" sz="2800" b="1" dirty="0">
@@ -6057,7 +6001,17 @@
                 <a:latin typeface="Times New Roman" panose="02020603050405020304" pitchFamily="18" charset="0"/>
                 <a:cs typeface="Times New Roman" panose="02020603050405020304" pitchFamily="18" charset="0"/>
               </a:rPr>
-              <a:t>During fine-tuning, validation is performed after each epoch using multiple metrics: macro F1-score, ROC AUC, and Precision-Recall AUC. Final evaluation on a held-out test set assesses generalization. To address class imbalance, a </a:t>
+              <a:t>During fine-tuning, validation is performed after each epoch using metrics such as macro F1-score, ROC AUC, and Precision-Recall AUC. Final evaluation on a held-out test set assesses generalization. </a:t>
+            </a:r>
+          </a:p>
+          <a:p>
+            <a:pPr algn="just" eaLnBrk="1" hangingPunct="1"/>
+            <a:r>
+              <a:rPr lang="en-US" sz="2800" dirty="0">
+                <a:latin typeface="Times New Roman" panose="02020603050405020304" pitchFamily="18" charset="0"/>
+                <a:cs typeface="Times New Roman" panose="02020603050405020304" pitchFamily="18" charset="0"/>
+              </a:rPr>
+              <a:t>To address class imbalance, a </a:t>
             </a:r>
             <a:r>
               <a:rPr lang="en-US" sz="2800" b="1" dirty="0">
@@ -6189,6 +6143,78 @@
           </a:p>
         </p:txBody>
       </p:sp>
+      <p:pic>
+        <p:nvPicPr>
+          <p:cNvPr id="6" name="Picture 5" descr="A blue squares with numbers and labels&#10;&#10;AI-generated content may be incorrect.">
+            <a:extLst>
+              <a:ext uri="{FF2B5EF4-FFF2-40B4-BE49-F238E27FC236}">
+                <a16:creationId xmlns:a16="http://schemas.microsoft.com/office/drawing/2014/main" id="{E782CC2A-400A-D5ED-D238-B3041CD7F9D1}"/>
+              </a:ext>
+            </a:extLst>
+          </p:cNvPr>
+          <p:cNvPicPr>
+            <a:picLocks noChangeAspect="1"/>
+          </p:cNvPicPr>
+          <p:nvPr/>
+        </p:nvPicPr>
+        <p:blipFill>
+          <a:blip r:embed="rId7">
+            <a:extLst>
+              <a:ext uri="{28A0092B-C50C-407E-A947-70E740481C1C}">
+                <a14:useLocalDpi xmlns:a14="http://schemas.microsoft.com/office/drawing/2010/main" val="0"/>
+              </a:ext>
+            </a:extLst>
+          </a:blip>
+          <a:stretch>
+            <a:fillRect/>
+          </a:stretch>
+        </p:blipFill>
+        <p:spPr>
+          <a:xfrm>
+            <a:off x="19545846" y="23564907"/>
+            <a:ext cx="9387840" cy="7040880"/>
+          </a:xfrm>
+          <a:prstGeom prst="rect">
+            <a:avLst/>
+          </a:prstGeom>
+        </p:spPr>
+      </p:pic>
+      <p:pic>
+        <p:nvPicPr>
+          <p:cNvPr id="13" name="Picture 12" descr="A blue squares with numbers and labels&#10;&#10;AI-generated content may be incorrect.">
+            <a:extLst>
+              <a:ext uri="{FF2B5EF4-FFF2-40B4-BE49-F238E27FC236}">
+                <a16:creationId xmlns:a16="http://schemas.microsoft.com/office/drawing/2014/main" id="{A5CEC627-BA09-8008-67B0-E5FD856E0D16}"/>
+              </a:ext>
+            </a:extLst>
+          </p:cNvPr>
+          <p:cNvPicPr>
+            <a:picLocks noChangeAspect="1"/>
+          </p:cNvPicPr>
+          <p:nvPr/>
+        </p:nvPicPr>
+        <p:blipFill>
+          <a:blip r:embed="rId8">
+            <a:extLst>
+              <a:ext uri="{28A0092B-C50C-407E-A947-70E740481C1C}">
+                <a14:useLocalDpi xmlns:a14="http://schemas.microsoft.com/office/drawing/2010/main" val="0"/>
+              </a:ext>
+            </a:extLst>
+          </a:blip>
+          <a:stretch>
+            <a:fillRect/>
+          </a:stretch>
+        </p:blipFill>
+        <p:spPr>
+          <a:xfrm>
+            <a:off x="19553783" y="15680518"/>
+            <a:ext cx="9387840" cy="7040880"/>
+          </a:xfrm>
+          <a:prstGeom prst="rect">
+            <a:avLst/>
+          </a:prstGeom>
+        </p:spPr>
+      </p:pic>
     </p:spTree>
     <p:extLst>
       <p:ext uri="{BB962C8B-B14F-4D97-AF65-F5344CB8AC3E}">

</xml_diff>